<commit_message>
updates to markdown content
</commit_message>
<xml_diff>
--- a/docs/presentations/MNCodesSummit.pptx
+++ b/docs/presentations/MNCodesSummit.pptx
@@ -4507,7 +4507,7 @@
           <a:blip r:embed="rId2">
             <a:extLst>
               <a:ext uri="{28A0092B-C50C-407E-A947-70E740481C1C}">
-                <a14:useLocalDpi xmlns:a14="http://schemas.microsoft.com/office/drawing/2010/main" val="0"/>
+                <a14:useLocalDpi xmlns:a14="http://schemas.microsoft.com/office/drawing/2010/main"/>
               </a:ext>
             </a:extLst>
           </a:blip>
@@ -4554,7 +4554,7 @@
           <a:blip r:embed="rId3">
             <a:extLst>
               <a:ext uri="{28A0092B-C50C-407E-A947-70E740481C1C}">
-                <a14:useLocalDpi xmlns:a14="http://schemas.microsoft.com/office/drawing/2010/main" val="0"/>
+                <a14:useLocalDpi xmlns:a14="http://schemas.microsoft.com/office/drawing/2010/main"/>
               </a:ext>
             </a:extLst>
           </a:blip>
@@ -4601,7 +4601,7 @@
           <a:blip r:embed="rId4">
             <a:extLst>
               <a:ext uri="{28A0092B-C50C-407E-A947-70E740481C1C}">
-                <a14:useLocalDpi xmlns:a14="http://schemas.microsoft.com/office/drawing/2010/main" val="0"/>
+                <a14:useLocalDpi xmlns:a14="http://schemas.microsoft.com/office/drawing/2010/main"/>
               </a:ext>
             </a:extLst>
           </a:blip>
@@ -4763,7 +4763,7 @@
           <a:blip r:embed="rId2">
             <a:extLst>
               <a:ext uri="{28A0092B-C50C-407E-A947-70E740481C1C}">
-                <a14:useLocalDpi xmlns:a14="http://schemas.microsoft.com/office/drawing/2010/main" val="0"/>
+                <a14:useLocalDpi xmlns:a14="http://schemas.microsoft.com/office/drawing/2010/main"/>
               </a:ext>
             </a:extLst>
           </a:blip>
@@ -5748,7 +5748,13 @@
           <p:nvPr/>
         </p:nvPicPr>
         <p:blipFill>
-          <a:blip r:embed="rId3"/>
+          <a:blip r:embed="rId3" cstate="screen">
+            <a:extLst>
+              <a:ext uri="{28A0092B-C50C-407E-A947-70E740481C1C}">
+                <a14:useLocalDpi xmlns:a14="http://schemas.microsoft.com/office/drawing/2010/main"/>
+              </a:ext>
+            </a:extLst>
+          </a:blip>
           <a:stretch>
             <a:fillRect/>
           </a:stretch>
@@ -5955,7 +5961,13 @@
           <p:nvPr/>
         </p:nvPicPr>
         <p:blipFill>
-          <a:blip r:embed="rId2"/>
+          <a:blip r:embed="rId2" cstate="screen">
+            <a:extLst>
+              <a:ext uri="{28A0092B-C50C-407E-A947-70E740481C1C}">
+                <a14:useLocalDpi xmlns:a14="http://schemas.microsoft.com/office/drawing/2010/main"/>
+              </a:ext>
+            </a:extLst>
+          </a:blip>
           <a:stretch>
             <a:fillRect/>
           </a:stretch>
@@ -41646,7 +41658,7 @@
           <a:blip r:embed="rId2">
             <a:extLst>
               <a:ext uri="{28A0092B-C50C-407E-A947-70E740481C1C}">
-                <a14:useLocalDpi xmlns:a14="http://schemas.microsoft.com/office/drawing/2010/main" val="0"/>
+                <a14:useLocalDpi xmlns:a14="http://schemas.microsoft.com/office/drawing/2010/main"/>
               </a:ext>
             </a:extLst>
           </a:blip>
@@ -41972,7 +41984,7 @@
           <a:blip r:embed="rId2">
             <a:extLst>
               <a:ext uri="{28A0092B-C50C-407E-A947-70E740481C1C}">
-                <a14:useLocalDpi xmlns:a14="http://schemas.microsoft.com/office/drawing/2010/main" val="0"/>
+                <a14:useLocalDpi xmlns:a14="http://schemas.microsoft.com/office/drawing/2010/main"/>
               </a:ext>
             </a:extLst>
           </a:blip>
@@ -42022,7 +42034,7 @@
           <a:blip r:embed="rId3">
             <a:extLst>
               <a:ext uri="{28A0092B-C50C-407E-A947-70E740481C1C}">
-                <a14:useLocalDpi xmlns:a14="http://schemas.microsoft.com/office/drawing/2010/main" val="0"/>
+                <a14:useLocalDpi xmlns:a14="http://schemas.microsoft.com/office/drawing/2010/main"/>
               </a:ext>
             </a:extLst>
           </a:blip>
@@ -43072,7 +43084,7 @@
           <a:blip r:embed="rId2">
             <a:extLst>
               <a:ext uri="{28A0092B-C50C-407E-A947-70E740481C1C}">
-                <a14:useLocalDpi xmlns:a14="http://schemas.microsoft.com/office/drawing/2010/main" val="0"/>
+                <a14:useLocalDpi xmlns:a14="http://schemas.microsoft.com/office/drawing/2010/main"/>
               </a:ext>
             </a:extLst>
           </a:blip>
@@ -43243,7 +43255,7 @@
           <a:blip r:embed="rId2">
             <a:extLst>
               <a:ext uri="{28A0092B-C50C-407E-A947-70E740481C1C}">
-                <a14:useLocalDpi xmlns:a14="http://schemas.microsoft.com/office/drawing/2010/main" val="0"/>
+                <a14:useLocalDpi xmlns:a14="http://schemas.microsoft.com/office/drawing/2010/main"/>
               </a:ext>
             </a:extLst>
           </a:blip>
@@ -46395,7 +46407,13 @@
           <p:nvPr/>
         </p:nvPicPr>
         <p:blipFill>
-          <a:blip r:embed="rId3"/>
+          <a:blip r:embed="rId3" cstate="screen">
+            <a:extLst>
+              <a:ext uri="{28A0092B-C50C-407E-A947-70E740481C1C}">
+                <a14:useLocalDpi xmlns:a14="http://schemas.microsoft.com/office/drawing/2010/main"/>
+              </a:ext>
+            </a:extLst>
+          </a:blip>
           <a:stretch>
             <a:fillRect/>
           </a:stretch>
@@ -46425,10 +46443,10 @@
           <p:nvPr/>
         </p:nvPicPr>
         <p:blipFill>
-          <a:blip r:embed="rId4">
+          <a:blip r:embed="rId4" cstate="screen">
             <a:extLst>
               <a:ext uri="{28A0092B-C50C-407E-A947-70E740481C1C}">
-                <a14:useLocalDpi xmlns:a14="http://schemas.microsoft.com/office/drawing/2010/main" val="0"/>
+                <a14:useLocalDpi xmlns:a14="http://schemas.microsoft.com/office/drawing/2010/main"/>
               </a:ext>
             </a:extLst>
           </a:blip>
@@ -47792,14 +47810,14 @@
           <p:nvPr/>
         </p:nvPicPr>
         <p:blipFill rotWithShape="1">
-          <a:blip r:embed="rId2">
+          <a:blip r:embed="rId2" cstate="screen">
             <a:extLst>
               <a:ext uri="{28A0092B-C50C-407E-A947-70E740481C1C}">
-                <a14:useLocalDpi xmlns:a14="http://schemas.microsoft.com/office/drawing/2010/main" val="0"/>
+                <a14:useLocalDpi xmlns:a14="http://schemas.microsoft.com/office/drawing/2010/main"/>
               </a:ext>
             </a:extLst>
           </a:blip>
-          <a:srcRect l="1" t="8359" r="36464"/>
+          <a:srcRect/>
           <a:stretch/>
         </p:blipFill>
         <p:spPr bwMode="auto">
@@ -48262,14 +48280,14 @@
           <p:nvPr/>
         </p:nvPicPr>
         <p:blipFill rotWithShape="1">
-          <a:blip r:embed="rId4">
+          <a:blip r:embed="rId4" cstate="screen">
             <a:extLst>
               <a:ext uri="{28A0092B-C50C-407E-A947-70E740481C1C}">
-                <a14:useLocalDpi xmlns:a14="http://schemas.microsoft.com/office/drawing/2010/main" val="0"/>
+                <a14:useLocalDpi xmlns:a14="http://schemas.microsoft.com/office/drawing/2010/main"/>
               </a:ext>
             </a:extLst>
           </a:blip>
-          <a:srcRect l="3249" t="10047" b="8004"/>
+          <a:srcRect/>
           <a:stretch/>
         </p:blipFill>
         <p:spPr bwMode="auto">

</xml_diff>